<commit_message>
(update) updated version of the presentation
</commit_message>
<xml_diff>
--- a/Sixt_RoboTaxi_App.pptx
+++ b/Sixt_RoboTaxi_App.pptx
@@ -6,14 +6,15 @@
     <p:sldMasterId id="2147483672" r:id="rId2"/>
   </p:sldMasterIdLst>
   <p:notesMasterIdLst>
-    <p:notesMasterId r:id="rId8"/>
+    <p:notesMasterId r:id="rId9"/>
   </p:notesMasterIdLst>
   <p:sldIdLst>
     <p:sldId id="256" r:id="rId3"/>
     <p:sldId id="257" r:id="rId4"/>
     <p:sldId id="258" r:id="rId5"/>
-    <p:sldId id="259" r:id="rId6"/>
-    <p:sldId id="260" r:id="rId7"/>
+    <p:sldId id="261" r:id="rId6"/>
+    <p:sldId id="259" r:id="rId7"/>
+    <p:sldId id="260" r:id="rId8"/>
   </p:sldIdLst>
   <p:sldSz cx="12192000" cy="6858000"/>
   <p:notesSz cx="6858000" cy="9144000"/>
@@ -112,6 +113,11 @@
       </a:defRPr>
     </a:lvl9pPr>
   </p:defaultTextStyle>
+  <p:extLst>
+    <p:ext uri="{EFAFB233-063F-42B5-8137-9DF3F51BA10A}">
+      <p15:sldGuideLst xmlns:p15="http://schemas.microsoft.com/office/powerpoint/2012/main"/>
+    </p:ext>
+  </p:extLst>
 </p:presentation>
 </file>
 
@@ -6780,13 +6786,14 @@
           </a:stretch>
         </p:blipFill>
         <p:spPr>
-          <a:xfrm>
-            <a:off x="7342663" y="3396641"/>
-            <a:ext cx="4558605" cy="2881039"/>
+          <a:xfrm flipH="1">
+            <a:off x="281354" y="3393123"/>
+            <a:ext cx="4375052" cy="2881039"/>
           </a:xfrm>
           <a:prstGeom prst="rect">
             <a:avLst/>
           </a:prstGeom>
+          <a:effectLst/>
         </p:spPr>
       </p:pic>
       <p:sp>
@@ -7089,7 +7096,22 @@
           <a:p>
             <a:r>
               <a:rPr lang="de-DE" dirty="0"/>
-              <a:t>Tristan Kaupa		, Back-End</a:t>
+              <a:t>Tristan Kaupa:		Computer Science, Main Back-End</a:t>
+            </a:r>
+          </a:p>
+          <a:p>
+            <a:pPr marL="0" indent="0">
+              <a:buNone/>
+            </a:pPr>
+            <a:r>
+              <a:rPr lang="de-DE" dirty="0"/>
+              <a:t>		</a:t>
+            </a:r>
+          </a:p>
+          <a:p>
+            <a:r>
+              <a:rPr lang="de-DE" dirty="0"/>
+              <a:t>Dennis Gölitz:		EI – Student, Front-End, Organisation </a:t>
             </a:r>
           </a:p>
           <a:p>
@@ -7106,16 +7128,11 @@
             </a:r>
             <a:r>
               <a:rPr lang="de-DE" dirty="0"/>
-              <a:t>		, Back-End</a:t>
-            </a:r>
-          </a:p>
-          <a:p>
-            <a:endParaRPr lang="de-DE" dirty="0"/>
-          </a:p>
-          <a:p>
-            <a:r>
-              <a:rPr lang="de-DE" dirty="0"/>
-              <a:t>Dennis Gölitz:		EI – Student, Front-End, Organisation </a:t>
+              <a:t>:		204 – Content not </a:t>
+            </a:r>
+            <a:r>
+              <a:rPr lang="de-DE" dirty="0" err="1"/>
+              <a:t>found</a:t>
             </a:r>
             <a:endParaRPr lang="en-US" dirty="0"/>
           </a:p>
@@ -7143,8 +7160,36 @@
           <a:lstStyle/>
           <a:p>
             <a:r>
-              <a:rPr lang="en-US"/>
-              <a:t>Sixt RoboTaxi App - Khadim Fall, Tristan Kaupa, Aiden Saulick, Dennis Gölitz - 22.11.2021</a:t>
+              <a:rPr lang="en-US" dirty="0" err="1"/>
+              <a:t>Sixt</a:t>
+            </a:r>
+            <a:r>
+              <a:rPr lang="en-US" dirty="0"/>
+              <a:t> </a:t>
+            </a:r>
+            <a:r>
+              <a:rPr lang="en-US" dirty="0" err="1"/>
+              <a:t>RoboTaxi</a:t>
+            </a:r>
+            <a:r>
+              <a:rPr lang="en-US" dirty="0"/>
+              <a:t> App - Khadim Fall, Tristan </a:t>
+            </a:r>
+            <a:r>
+              <a:rPr lang="en-US" dirty="0" err="1"/>
+              <a:t>Kaupa</a:t>
+            </a:r>
+            <a:r>
+              <a:rPr lang="en-US" dirty="0"/>
+              <a:t>, Aiden </a:t>
+            </a:r>
+            <a:r>
+              <a:rPr lang="en-US" dirty="0" err="1"/>
+              <a:t>Saulick</a:t>
+            </a:r>
+            <a:r>
+              <a:rPr lang="en-US" dirty="0"/>
+              <a:t>, Dennis Gölitz - 22.11.2021</a:t>
             </a:r>
           </a:p>
         </p:txBody>
@@ -7232,10 +7277,224 @@
             <p:ph idx="1"/>
           </p:nvPr>
         </p:nvSpPr>
-        <p:spPr/>
-        <p:txBody>
-          <a:bodyPr/>
-          <a:lstStyle/>
+        <p:spPr>
+          <a:xfrm>
+            <a:off x="838200" y="1584325"/>
+            <a:ext cx="10515600" cy="4351338"/>
+          </a:xfrm>
+        </p:spPr>
+        <p:txBody>
+          <a:bodyPr>
+            <a:normAutofit fontScale="92500" lnSpcReduction="10000"/>
+          </a:bodyPr>
+          <a:lstStyle/>
+          <a:p>
+            <a:r>
+              <a:rPr lang="de-DE" dirty="0"/>
+              <a:t>Login and Settings Menu</a:t>
+            </a:r>
+          </a:p>
+          <a:p>
+            <a:endParaRPr lang="de-DE" dirty="0"/>
+          </a:p>
+          <a:p>
+            <a:r>
+              <a:rPr lang="de-DE" dirty="0" err="1"/>
+              <a:t>Four</a:t>
+            </a:r>
+            <a:r>
+              <a:rPr lang="de-DE" dirty="0"/>
+              <a:t> Modes </a:t>
+            </a:r>
+            <a:r>
+              <a:rPr lang="de-DE" dirty="0" err="1"/>
+              <a:t>to</a:t>
+            </a:r>
+            <a:r>
+              <a:rPr lang="de-DE" dirty="0"/>
+              <a:t> </a:t>
+            </a:r>
+            <a:r>
+              <a:rPr lang="de-DE" dirty="0" err="1"/>
+              <a:t>choose</a:t>
+            </a:r>
+            <a:r>
+              <a:rPr lang="de-DE" dirty="0"/>
+              <a:t>: </a:t>
+            </a:r>
+          </a:p>
+          <a:p>
+            <a:pPr lvl="1"/>
+            <a:r>
+              <a:rPr lang="de-DE" dirty="0"/>
+              <a:t>Solo </a:t>
+            </a:r>
+            <a:r>
+              <a:rPr lang="de-DE" dirty="0" err="1"/>
+              <a:t>RoboTaxi</a:t>
+            </a:r>
+            <a:r>
+              <a:rPr lang="de-DE" dirty="0"/>
+              <a:t> Drive</a:t>
+            </a:r>
+          </a:p>
+          <a:p>
+            <a:pPr lvl="1"/>
+            <a:r>
+              <a:rPr lang="de-DE" dirty="0"/>
+              <a:t> </a:t>
+            </a:r>
+            <a:r>
+              <a:rPr lang="de-DE" dirty="0" err="1"/>
+              <a:t>Social</a:t>
+            </a:r>
+            <a:r>
+              <a:rPr lang="de-DE" dirty="0"/>
+              <a:t> Drive</a:t>
+            </a:r>
+          </a:p>
+          <a:p>
+            <a:pPr lvl="1"/>
+            <a:r>
+              <a:rPr lang="de-DE" dirty="0"/>
+              <a:t>Sightseeing Mode </a:t>
+            </a:r>
+          </a:p>
+          <a:p>
+            <a:pPr lvl="1"/>
+            <a:r>
+              <a:rPr lang="de-DE" dirty="0" err="1"/>
+              <a:t>Delivery</a:t>
+            </a:r>
+            <a:r>
+              <a:rPr lang="de-DE" dirty="0"/>
+              <a:t> Mode</a:t>
+            </a:r>
+          </a:p>
+          <a:p>
+            <a:pPr lvl="1"/>
+            <a:endParaRPr lang="de-DE" dirty="0"/>
+          </a:p>
+          <a:p>
+            <a:r>
+              <a:rPr lang="de-DE" dirty="0"/>
+              <a:t>Search </a:t>
+            </a:r>
+            <a:r>
+              <a:rPr lang="de-DE" dirty="0" err="1"/>
+              <a:t>for</a:t>
+            </a:r>
+            <a:r>
+              <a:rPr lang="de-DE" dirty="0"/>
+              <a:t> </a:t>
+            </a:r>
+            <a:r>
+              <a:rPr lang="de-DE" dirty="0" err="1"/>
+              <a:t>pickup</a:t>
+            </a:r>
+            <a:r>
+              <a:rPr lang="de-DE" dirty="0"/>
+              <a:t> </a:t>
+            </a:r>
+            <a:r>
+              <a:rPr lang="de-DE" dirty="0" err="1"/>
+              <a:t>location</a:t>
+            </a:r>
+            <a:r>
+              <a:rPr lang="de-DE" dirty="0"/>
+              <a:t> </a:t>
+            </a:r>
+            <a:r>
+              <a:rPr lang="de-DE" dirty="0" err="1"/>
+              <a:t>or</a:t>
+            </a:r>
+            <a:r>
+              <a:rPr lang="de-DE" dirty="0"/>
+              <a:t> </a:t>
+            </a:r>
+            <a:r>
+              <a:rPr lang="de-DE" dirty="0" err="1"/>
+              <a:t>use</a:t>
+            </a:r>
+            <a:r>
+              <a:rPr lang="de-DE" dirty="0"/>
+              <a:t> </a:t>
+            </a:r>
+            <a:r>
+              <a:rPr lang="de-DE" dirty="0" err="1"/>
+              <a:t>geopositioning</a:t>
+            </a:r>
+            <a:r>
+              <a:rPr lang="de-DE" dirty="0"/>
+              <a:t> </a:t>
+            </a:r>
+            <a:r>
+              <a:rPr lang="de-DE" dirty="0" err="1"/>
+              <a:t>of</a:t>
+            </a:r>
+            <a:r>
+              <a:rPr lang="de-DE" dirty="0"/>
+              <a:t> Mobile </a:t>
+            </a:r>
+            <a:r>
+              <a:rPr lang="de-DE" dirty="0" err="1"/>
+              <a:t>device</a:t>
+            </a:r>
+            <a:endParaRPr lang="de-DE" dirty="0"/>
+          </a:p>
+          <a:p>
+            <a:endParaRPr lang="de-DE" dirty="0"/>
+          </a:p>
+          <a:p>
+            <a:r>
+              <a:rPr lang="de-DE" dirty="0" err="1"/>
+              <a:t>Autofilling</a:t>
+            </a:r>
+            <a:r>
+              <a:rPr lang="de-DE" dirty="0"/>
+              <a:t> </a:t>
+            </a:r>
+            <a:r>
+              <a:rPr lang="de-DE" dirty="0" err="1"/>
+              <a:t>the</a:t>
+            </a:r>
+            <a:r>
+              <a:rPr lang="de-DE" dirty="0"/>
+              <a:t> </a:t>
+            </a:r>
+            <a:r>
+              <a:rPr lang="de-DE" dirty="0" err="1"/>
+              <a:t>destination</a:t>
+            </a:r>
+            <a:r>
+              <a:rPr lang="de-DE" dirty="0"/>
+              <a:t> </a:t>
+            </a:r>
+            <a:r>
+              <a:rPr lang="de-DE" dirty="0" err="1"/>
+              <a:t>based</a:t>
+            </a:r>
+            <a:r>
+              <a:rPr lang="de-DE" dirty="0"/>
+              <a:t> on last </a:t>
+            </a:r>
+            <a:r>
+              <a:rPr lang="de-DE" dirty="0" err="1"/>
+              <a:t>rides</a:t>
+            </a:r>
+            <a:r>
+              <a:rPr lang="de-DE" dirty="0"/>
+              <a:t> and </a:t>
+            </a:r>
+            <a:r>
+              <a:rPr lang="de-DE" dirty="0" err="1"/>
+              <a:t>input</a:t>
+            </a:r>
+            <a:endParaRPr lang="de-DE" dirty="0"/>
+          </a:p>
+          <a:p>
+            <a:endParaRPr lang="de-DE" dirty="0"/>
+          </a:p>
           <a:p>
             <a:endParaRPr lang="en-US" dirty="0"/>
           </a:p>
@@ -7301,6 +7560,363 @@
       </p:grpSpPr>
       <p:sp>
         <p:nvSpPr>
+          <p:cNvPr id="2" name="Titel 1">
+            <a:extLst>
+              <a:ext uri="{FF2B5EF4-FFF2-40B4-BE49-F238E27FC236}">
+                <a16:creationId xmlns:a16="http://schemas.microsoft.com/office/drawing/2014/main" id="{CF1D9DEA-147D-4DCC-B884-7AA69ADB5CA8}"/>
+              </a:ext>
+            </a:extLst>
+          </p:cNvPr>
+          <p:cNvSpPr>
+            <a:spLocks noGrp="1"/>
+          </p:cNvSpPr>
+          <p:nvPr>
+            <p:ph type="title"/>
+          </p:nvPr>
+        </p:nvSpPr>
+        <p:spPr/>
+        <p:txBody>
+          <a:bodyPr/>
+          <a:lstStyle/>
+          <a:p>
+            <a:r>
+              <a:rPr lang="de-DE" dirty="0">
+                <a:solidFill>
+                  <a:srgbClr val="FF6600"/>
+                </a:solidFill>
+              </a:rPr>
+              <a:t>Features</a:t>
+            </a:r>
+            <a:endParaRPr lang="en-US" dirty="0">
+              <a:solidFill>
+                <a:srgbClr val="FF6600"/>
+              </a:solidFill>
+            </a:endParaRPr>
+          </a:p>
+        </p:txBody>
+      </p:sp>
+      <p:sp>
+        <p:nvSpPr>
+          <p:cNvPr id="3" name="Inhaltsplatzhalter 2">
+            <a:extLst>
+              <a:ext uri="{FF2B5EF4-FFF2-40B4-BE49-F238E27FC236}">
+                <a16:creationId xmlns:a16="http://schemas.microsoft.com/office/drawing/2014/main" id="{69743D57-A7C0-433A-8E55-AE618669AE33}"/>
+              </a:ext>
+            </a:extLst>
+          </p:cNvPr>
+          <p:cNvSpPr>
+            <a:spLocks noGrp="1"/>
+          </p:cNvSpPr>
+          <p:nvPr>
+            <p:ph idx="1"/>
+          </p:nvPr>
+        </p:nvSpPr>
+        <p:spPr/>
+        <p:txBody>
+          <a:bodyPr/>
+          <a:lstStyle/>
+          <a:p>
+            <a:r>
+              <a:rPr lang="de-DE" dirty="0" err="1"/>
+              <a:t>Visualization</a:t>
+            </a:r>
+            <a:r>
+              <a:rPr lang="de-DE" dirty="0"/>
+              <a:t> </a:t>
+            </a:r>
+            <a:r>
+              <a:rPr lang="de-DE" dirty="0" err="1"/>
+              <a:t>of</a:t>
+            </a:r>
+            <a:r>
+              <a:rPr lang="de-DE" dirty="0"/>
+              <a:t> </a:t>
+            </a:r>
+            <a:r>
+              <a:rPr lang="de-DE" dirty="0" err="1"/>
+              <a:t>your</a:t>
+            </a:r>
+            <a:r>
+              <a:rPr lang="de-DE" dirty="0"/>
+              <a:t> Geoposition and </a:t>
+            </a:r>
+            <a:r>
+              <a:rPr lang="de-DE" dirty="0" err="1"/>
+              <a:t>the</a:t>
+            </a:r>
+            <a:r>
+              <a:rPr lang="de-DE" dirty="0"/>
+              <a:t> </a:t>
+            </a:r>
+            <a:r>
+              <a:rPr lang="de-DE" dirty="0" err="1"/>
+              <a:t>one</a:t>
+            </a:r>
+            <a:r>
+              <a:rPr lang="de-DE" dirty="0"/>
+              <a:t> </a:t>
+            </a:r>
+            <a:r>
+              <a:rPr lang="de-DE" dirty="0" err="1"/>
+              <a:t>from</a:t>
+            </a:r>
+            <a:r>
+              <a:rPr lang="de-DE" dirty="0"/>
+              <a:t> </a:t>
+            </a:r>
+            <a:r>
+              <a:rPr lang="de-DE" dirty="0" err="1"/>
+              <a:t>the</a:t>
+            </a:r>
+            <a:r>
+              <a:rPr lang="de-DE" dirty="0"/>
+              <a:t> </a:t>
+            </a:r>
+            <a:r>
+              <a:rPr lang="de-DE" dirty="0" err="1"/>
+              <a:t>car</a:t>
+            </a:r>
+            <a:endParaRPr lang="de-DE" dirty="0"/>
+          </a:p>
+          <a:p>
+            <a:endParaRPr lang="de-DE" dirty="0"/>
+          </a:p>
+          <a:p>
+            <a:r>
+              <a:rPr lang="de-DE" dirty="0"/>
+              <a:t>Waiting time </a:t>
+            </a:r>
+            <a:r>
+              <a:rPr lang="de-DE" dirty="0" err="1"/>
+              <a:t>calculation</a:t>
+            </a:r>
+            <a:r>
+              <a:rPr lang="de-DE" dirty="0"/>
+              <a:t> and </a:t>
+            </a:r>
+            <a:r>
+              <a:rPr lang="de-DE" dirty="0" err="1"/>
+              <a:t>sending</a:t>
+            </a:r>
+            <a:r>
+              <a:rPr lang="de-DE" dirty="0"/>
+              <a:t> </a:t>
+            </a:r>
+            <a:r>
+              <a:rPr lang="de-DE" dirty="0" err="1"/>
+              <a:t>car</a:t>
+            </a:r>
+            <a:r>
+              <a:rPr lang="de-DE" dirty="0"/>
+              <a:t> </a:t>
+            </a:r>
+            <a:r>
+              <a:rPr lang="de-DE" dirty="0" err="1"/>
+              <a:t>to</a:t>
+            </a:r>
+            <a:r>
+              <a:rPr lang="de-DE" dirty="0"/>
+              <a:t> </a:t>
+            </a:r>
+            <a:r>
+              <a:rPr lang="de-DE" dirty="0" err="1"/>
+              <a:t>pickup</a:t>
+            </a:r>
+            <a:r>
+              <a:rPr lang="de-DE" dirty="0"/>
+              <a:t> </a:t>
+            </a:r>
+            <a:r>
+              <a:rPr lang="de-DE" dirty="0" err="1"/>
+              <a:t>place</a:t>
+            </a:r>
+            <a:endParaRPr lang="de-DE" dirty="0"/>
+          </a:p>
+          <a:p>
+            <a:pPr marL="0" indent="0">
+              <a:buNone/>
+            </a:pPr>
+            <a:endParaRPr lang="de-DE" dirty="0"/>
+          </a:p>
+          <a:p>
+            <a:r>
+              <a:rPr lang="de-DE" dirty="0" err="1"/>
+              <a:t>Starting</a:t>
+            </a:r>
+            <a:r>
+              <a:rPr lang="de-DE" dirty="0"/>
+              <a:t> </a:t>
+            </a:r>
+            <a:r>
+              <a:rPr lang="de-DE" dirty="0" err="1"/>
+              <a:t>the</a:t>
+            </a:r>
+            <a:r>
+              <a:rPr lang="de-DE" dirty="0"/>
+              <a:t> </a:t>
+            </a:r>
+            <a:r>
+              <a:rPr lang="de-DE" dirty="0" err="1"/>
+              <a:t>ride</a:t>
+            </a:r>
+            <a:r>
+              <a:rPr lang="de-DE" dirty="0"/>
+              <a:t> </a:t>
+            </a:r>
+            <a:r>
+              <a:rPr lang="de-DE" dirty="0" err="1"/>
+              <a:t>once</a:t>
+            </a:r>
+            <a:r>
+              <a:rPr lang="de-DE" dirty="0"/>
+              <a:t> </a:t>
+            </a:r>
+            <a:r>
+              <a:rPr lang="de-DE" dirty="0" err="1"/>
+              <a:t>you</a:t>
+            </a:r>
+            <a:r>
+              <a:rPr lang="de-DE" dirty="0"/>
+              <a:t> and all </a:t>
+            </a:r>
+            <a:r>
+              <a:rPr lang="de-DE" dirty="0" err="1"/>
+              <a:t>baggage</a:t>
+            </a:r>
+            <a:r>
+              <a:rPr lang="de-DE" dirty="0"/>
+              <a:t> </a:t>
+            </a:r>
+            <a:r>
+              <a:rPr lang="de-DE" dirty="0" err="1"/>
+              <a:t>is</a:t>
+            </a:r>
+            <a:r>
+              <a:rPr lang="de-DE" dirty="0"/>
+              <a:t> in</a:t>
+            </a:r>
+          </a:p>
+          <a:p>
+            <a:endParaRPr lang="de-DE" dirty="0"/>
+          </a:p>
+          <a:p>
+            <a:r>
+              <a:rPr lang="de-DE" dirty="0" err="1"/>
+              <a:t>Dropping</a:t>
+            </a:r>
+            <a:r>
+              <a:rPr lang="de-DE" dirty="0"/>
+              <a:t> </a:t>
+            </a:r>
+            <a:r>
+              <a:rPr lang="de-DE" dirty="0" err="1"/>
+              <a:t>you</a:t>
+            </a:r>
+            <a:r>
+              <a:rPr lang="de-DE" dirty="0"/>
+              <a:t> </a:t>
+            </a:r>
+            <a:r>
+              <a:rPr lang="de-DE" dirty="0" err="1"/>
+              <a:t>of</a:t>
+            </a:r>
+            <a:r>
+              <a:rPr lang="de-DE" dirty="0"/>
+              <a:t> at </a:t>
+            </a:r>
+            <a:r>
+              <a:rPr lang="de-DE" dirty="0" err="1"/>
+              <a:t>the</a:t>
+            </a:r>
+            <a:r>
+              <a:rPr lang="de-DE" dirty="0"/>
+              <a:t> </a:t>
+            </a:r>
+            <a:r>
+              <a:rPr lang="de-DE" dirty="0" err="1"/>
+              <a:t>choosen</a:t>
+            </a:r>
+            <a:r>
+              <a:rPr lang="de-DE" dirty="0"/>
+              <a:t> </a:t>
+            </a:r>
+            <a:r>
+              <a:rPr lang="de-DE" dirty="0" err="1"/>
+              <a:t>place</a:t>
+            </a:r>
+            <a:endParaRPr lang="de-DE" dirty="0"/>
+          </a:p>
+          <a:p>
+            <a:endParaRPr lang="de-DE" dirty="0"/>
+          </a:p>
+          <a:p>
+            <a:endParaRPr lang="de-DE" dirty="0"/>
+          </a:p>
+          <a:p>
+            <a:endParaRPr lang="en-US" dirty="0"/>
+          </a:p>
+        </p:txBody>
+      </p:sp>
+      <p:sp>
+        <p:nvSpPr>
+          <p:cNvPr id="4" name="Fußzeilenplatzhalter 3">
+            <a:extLst>
+              <a:ext uri="{FF2B5EF4-FFF2-40B4-BE49-F238E27FC236}">
+                <a16:creationId xmlns:a16="http://schemas.microsoft.com/office/drawing/2014/main" id="{C036C75B-DC43-4650-B9DE-D9E830A77F70}"/>
+              </a:ext>
+            </a:extLst>
+          </p:cNvPr>
+          <p:cNvSpPr>
+            <a:spLocks noGrp="1"/>
+          </p:cNvSpPr>
+          <p:nvPr>
+            <p:ph type="ftr" sz="quarter" idx="11"/>
+          </p:nvPr>
+        </p:nvSpPr>
+        <p:spPr/>
+        <p:txBody>
+          <a:bodyPr/>
+          <a:lstStyle/>
+          <a:p>
+            <a:r>
+              <a:rPr lang="en-US"/>
+              <a:t>Sixt RoboTaxi App - Khadim Fall, Tristan Kaupa, Aiden Saulick, Dennis Gölitz - 22.11.2021</a:t>
+            </a:r>
+          </a:p>
+        </p:txBody>
+      </p:sp>
+    </p:spTree>
+    <p:extLst>
+      <p:ext uri="{BB962C8B-B14F-4D97-AF65-F5344CB8AC3E}">
+        <p14:creationId xmlns:p14="http://schemas.microsoft.com/office/powerpoint/2010/main" val="1482652589"/>
+      </p:ext>
+    </p:extLst>
+  </p:cSld>
+  <p:clrMapOvr>
+    <a:masterClrMapping/>
+  </p:clrMapOvr>
+</p:sld>
+</file>
+
+<file path=ppt/slides/slide5.xml><?xml version="1.0" encoding="utf-8"?>
+<p:sld xmlns:a="http://schemas.openxmlformats.org/drawingml/2006/main" xmlns:r="http://schemas.openxmlformats.org/officeDocument/2006/relationships" xmlns:p="http://schemas.openxmlformats.org/presentationml/2006/main">
+  <p:cSld>
+    <p:spTree>
+      <p:nvGrpSpPr>
+        <p:cNvPr id="1" name=""/>
+        <p:cNvGrpSpPr/>
+        <p:nvPr/>
+      </p:nvGrpSpPr>
+      <p:grpSpPr>
+        <a:xfrm>
+          <a:off x="0" y="0"/>
+          <a:ext cx="0" cy="0"/>
+          <a:chOff x="0" y="0"/>
+          <a:chExt cx="0" cy="0"/>
+        </a:xfrm>
+      </p:grpSpPr>
+      <p:sp>
+        <p:nvSpPr>
           <p:cNvPr id="3" name="Inhaltsplatzhalter 2">
             <a:extLst>
               <a:ext uri="{FF2B5EF4-FFF2-40B4-BE49-F238E27FC236}">
@@ -7387,7 +8003,7 @@
 </p:sld>
 </file>
 
-<file path=ppt/slides/slide5.xml><?xml version="1.0" encoding="utf-8"?>
+<file path=ppt/slides/slide6.xml><?xml version="1.0" encoding="utf-8"?>
 <p:sld xmlns:a="http://schemas.openxmlformats.org/drawingml/2006/main" xmlns:r="http://schemas.openxmlformats.org/officeDocument/2006/relationships" xmlns:p="http://schemas.openxmlformats.org/presentationml/2006/main">
   <p:cSld>
     <p:spTree>
@@ -7742,7 +8358,7 @@
         <p:spPr>
           <a:xfrm>
             <a:off x="47604" y="60912"/>
-            <a:ext cx="2374900" cy="2374900"/>
+            <a:ext cx="1866362" cy="1866362"/>
           </a:xfrm>
           <a:prstGeom prst="rect">
             <a:avLst/>

</xml_diff>